<commit_message>
add PWP da RN
</commit_message>
<xml_diff>
--- a/lista_4/AVL/Árvore AVL.pptx
+++ b/lista_4/AVL/Árvore AVL.pptx
@@ -13,6 +13,7 @@
     <p:sldId id="261" r:id="rId7"/>
     <p:sldId id="262" r:id="rId8"/>
     <p:sldId id="263" r:id="rId9"/>
+    <p:sldId id="264" r:id="rId10"/>
   </p:sldIdLst>
   <p:sldSz cx="12192000" cy="6858000"/>
   <p:notesSz cx="6858000" cy="9144000"/>
@@ -268,7 +269,7 @@
               <a:rPr lang="pt-BR" smtClean="0"/>
               <a:t>11/05/2022</a:t>
             </a:fld>
-            <a:endParaRPr lang="pt-BR"/>
+            <a:endParaRPr lang="pt-BR" dirty="0"/>
           </a:p>
         </p:txBody>
       </p:sp>
@@ -293,7 +294,7 @@
           <a:bodyPr/>
           <a:lstStyle/>
           <a:p>
-            <a:endParaRPr lang="pt-BR"/>
+            <a:endParaRPr lang="pt-BR" dirty="0"/>
           </a:p>
         </p:txBody>
       </p:sp>
@@ -322,7 +323,7 @@
               <a:rPr lang="pt-BR" smtClean="0"/>
               <a:t>‹nº›</a:t>
             </a:fld>
-            <a:endParaRPr lang="pt-BR"/>
+            <a:endParaRPr lang="pt-BR" dirty="0"/>
           </a:p>
         </p:txBody>
       </p:sp>
@@ -466,7 +467,7 @@
               <a:rPr lang="pt-BR" smtClean="0"/>
               <a:t>11/05/2022</a:t>
             </a:fld>
-            <a:endParaRPr lang="pt-BR"/>
+            <a:endParaRPr lang="pt-BR" dirty="0"/>
           </a:p>
         </p:txBody>
       </p:sp>
@@ -491,7 +492,7 @@
           <a:bodyPr/>
           <a:lstStyle/>
           <a:p>
-            <a:endParaRPr lang="pt-BR"/>
+            <a:endParaRPr lang="pt-BR" dirty="0"/>
           </a:p>
         </p:txBody>
       </p:sp>
@@ -520,7 +521,7 @@
               <a:rPr lang="pt-BR" smtClean="0"/>
               <a:t>‹nº›</a:t>
             </a:fld>
-            <a:endParaRPr lang="pt-BR"/>
+            <a:endParaRPr lang="pt-BR" dirty="0"/>
           </a:p>
         </p:txBody>
       </p:sp>
@@ -674,7 +675,7 @@
               <a:rPr lang="pt-BR" smtClean="0"/>
               <a:t>11/05/2022</a:t>
             </a:fld>
-            <a:endParaRPr lang="pt-BR"/>
+            <a:endParaRPr lang="pt-BR" dirty="0"/>
           </a:p>
         </p:txBody>
       </p:sp>
@@ -699,7 +700,7 @@
           <a:bodyPr/>
           <a:lstStyle/>
           <a:p>
-            <a:endParaRPr lang="pt-BR"/>
+            <a:endParaRPr lang="pt-BR" dirty="0"/>
           </a:p>
         </p:txBody>
       </p:sp>
@@ -728,7 +729,7 @@
               <a:rPr lang="pt-BR" smtClean="0"/>
               <a:t>‹nº›</a:t>
             </a:fld>
-            <a:endParaRPr lang="pt-BR"/>
+            <a:endParaRPr lang="pt-BR" dirty="0"/>
           </a:p>
         </p:txBody>
       </p:sp>
@@ -872,7 +873,7 @@
               <a:rPr lang="pt-BR" smtClean="0"/>
               <a:t>11/05/2022</a:t>
             </a:fld>
-            <a:endParaRPr lang="pt-BR"/>
+            <a:endParaRPr lang="pt-BR" dirty="0"/>
           </a:p>
         </p:txBody>
       </p:sp>
@@ -897,7 +898,7 @@
           <a:bodyPr/>
           <a:lstStyle/>
           <a:p>
-            <a:endParaRPr lang="pt-BR"/>
+            <a:endParaRPr lang="pt-BR" dirty="0"/>
           </a:p>
         </p:txBody>
       </p:sp>
@@ -926,7 +927,7 @@
               <a:rPr lang="pt-BR" smtClean="0"/>
               <a:t>‹nº›</a:t>
             </a:fld>
-            <a:endParaRPr lang="pt-BR"/>
+            <a:endParaRPr lang="pt-BR" dirty="0"/>
           </a:p>
         </p:txBody>
       </p:sp>
@@ -1147,7 +1148,7 @@
               <a:rPr lang="pt-BR" smtClean="0"/>
               <a:t>11/05/2022</a:t>
             </a:fld>
-            <a:endParaRPr lang="pt-BR"/>
+            <a:endParaRPr lang="pt-BR" dirty="0"/>
           </a:p>
         </p:txBody>
       </p:sp>
@@ -1172,7 +1173,7 @@
           <a:bodyPr/>
           <a:lstStyle/>
           <a:p>
-            <a:endParaRPr lang="pt-BR"/>
+            <a:endParaRPr lang="pt-BR" dirty="0"/>
           </a:p>
         </p:txBody>
       </p:sp>
@@ -1201,7 +1202,7 @@
               <a:rPr lang="pt-BR" smtClean="0"/>
               <a:t>‹nº›</a:t>
             </a:fld>
-            <a:endParaRPr lang="pt-BR"/>
+            <a:endParaRPr lang="pt-BR" dirty="0"/>
           </a:p>
         </p:txBody>
       </p:sp>
@@ -1412,7 +1413,7 @@
               <a:rPr lang="pt-BR" smtClean="0"/>
               <a:t>11/05/2022</a:t>
             </a:fld>
-            <a:endParaRPr lang="pt-BR"/>
+            <a:endParaRPr lang="pt-BR" dirty="0"/>
           </a:p>
         </p:txBody>
       </p:sp>
@@ -1437,7 +1438,7 @@
           <a:bodyPr/>
           <a:lstStyle/>
           <a:p>
-            <a:endParaRPr lang="pt-BR"/>
+            <a:endParaRPr lang="pt-BR" dirty="0"/>
           </a:p>
         </p:txBody>
       </p:sp>
@@ -1466,7 +1467,7 @@
               <a:rPr lang="pt-BR" smtClean="0"/>
               <a:t>‹nº›</a:t>
             </a:fld>
-            <a:endParaRPr lang="pt-BR"/>
+            <a:endParaRPr lang="pt-BR" dirty="0"/>
           </a:p>
         </p:txBody>
       </p:sp>
@@ -1824,7 +1825,7 @@
               <a:rPr lang="pt-BR" smtClean="0"/>
               <a:t>11/05/2022</a:t>
             </a:fld>
-            <a:endParaRPr lang="pt-BR"/>
+            <a:endParaRPr lang="pt-BR" dirty="0"/>
           </a:p>
         </p:txBody>
       </p:sp>
@@ -1849,7 +1850,7 @@
           <a:bodyPr/>
           <a:lstStyle/>
           <a:p>
-            <a:endParaRPr lang="pt-BR"/>
+            <a:endParaRPr lang="pt-BR" dirty="0"/>
           </a:p>
         </p:txBody>
       </p:sp>
@@ -1878,7 +1879,7 @@
               <a:rPr lang="pt-BR" smtClean="0"/>
               <a:t>‹nº›</a:t>
             </a:fld>
-            <a:endParaRPr lang="pt-BR"/>
+            <a:endParaRPr lang="pt-BR" dirty="0"/>
           </a:p>
         </p:txBody>
       </p:sp>
@@ -1965,7 +1966,7 @@
               <a:rPr lang="pt-BR" smtClean="0"/>
               <a:t>11/05/2022</a:t>
             </a:fld>
-            <a:endParaRPr lang="pt-BR"/>
+            <a:endParaRPr lang="pt-BR" dirty="0"/>
           </a:p>
         </p:txBody>
       </p:sp>
@@ -1990,7 +1991,7 @@
           <a:bodyPr/>
           <a:lstStyle/>
           <a:p>
-            <a:endParaRPr lang="pt-BR"/>
+            <a:endParaRPr lang="pt-BR" dirty="0"/>
           </a:p>
         </p:txBody>
       </p:sp>
@@ -2019,7 +2020,7 @@
               <a:rPr lang="pt-BR" smtClean="0"/>
               <a:t>‹nº›</a:t>
             </a:fld>
-            <a:endParaRPr lang="pt-BR"/>
+            <a:endParaRPr lang="pt-BR" dirty="0"/>
           </a:p>
         </p:txBody>
       </p:sp>
@@ -2078,7 +2079,7 @@
               <a:rPr lang="pt-BR" smtClean="0"/>
               <a:t>11/05/2022</a:t>
             </a:fld>
-            <a:endParaRPr lang="pt-BR"/>
+            <a:endParaRPr lang="pt-BR" dirty="0"/>
           </a:p>
         </p:txBody>
       </p:sp>
@@ -2103,7 +2104,7 @@
           <a:bodyPr/>
           <a:lstStyle/>
           <a:p>
-            <a:endParaRPr lang="pt-BR"/>
+            <a:endParaRPr lang="pt-BR" dirty="0"/>
           </a:p>
         </p:txBody>
       </p:sp>
@@ -2132,7 +2133,7 @@
               <a:rPr lang="pt-BR" smtClean="0"/>
               <a:t>‹nº›</a:t>
             </a:fld>
-            <a:endParaRPr lang="pt-BR"/>
+            <a:endParaRPr lang="pt-BR" dirty="0"/>
           </a:p>
         </p:txBody>
       </p:sp>
@@ -2389,7 +2390,7 @@
               <a:rPr lang="pt-BR" smtClean="0"/>
               <a:t>11/05/2022</a:t>
             </a:fld>
-            <a:endParaRPr lang="pt-BR"/>
+            <a:endParaRPr lang="pt-BR" dirty="0"/>
           </a:p>
         </p:txBody>
       </p:sp>
@@ -2414,7 +2415,7 @@
           <a:bodyPr/>
           <a:lstStyle/>
           <a:p>
-            <a:endParaRPr lang="pt-BR"/>
+            <a:endParaRPr lang="pt-BR" dirty="0"/>
           </a:p>
         </p:txBody>
       </p:sp>
@@ -2443,7 +2444,7 @@
               <a:rPr lang="pt-BR" smtClean="0"/>
               <a:t>‹nº›</a:t>
             </a:fld>
-            <a:endParaRPr lang="pt-BR"/>
+            <a:endParaRPr lang="pt-BR" dirty="0"/>
           </a:p>
         </p:txBody>
       </p:sp>
@@ -2577,7 +2578,7 @@
             </a:lvl9pPr>
           </a:lstStyle>
           <a:p>
-            <a:endParaRPr lang="pt-BR"/>
+            <a:endParaRPr lang="pt-BR" dirty="0"/>
           </a:p>
         </p:txBody>
       </p:sp>
@@ -2677,7 +2678,7 @@
               <a:rPr lang="pt-BR" smtClean="0"/>
               <a:t>11/05/2022</a:t>
             </a:fld>
-            <a:endParaRPr lang="pt-BR"/>
+            <a:endParaRPr lang="pt-BR" dirty="0"/>
           </a:p>
         </p:txBody>
       </p:sp>
@@ -2702,7 +2703,7 @@
           <a:bodyPr/>
           <a:lstStyle/>
           <a:p>
-            <a:endParaRPr lang="pt-BR"/>
+            <a:endParaRPr lang="pt-BR" dirty="0"/>
           </a:p>
         </p:txBody>
       </p:sp>
@@ -2731,7 +2732,7 @@
               <a:rPr lang="pt-BR" smtClean="0"/>
               <a:t>‹nº›</a:t>
             </a:fld>
-            <a:endParaRPr lang="pt-BR"/>
+            <a:endParaRPr lang="pt-BR" dirty="0"/>
           </a:p>
         </p:txBody>
       </p:sp>
@@ -2918,7 +2919,7 @@
               <a:rPr lang="pt-BR" smtClean="0"/>
               <a:t>11/05/2022</a:t>
             </a:fld>
-            <a:endParaRPr lang="pt-BR"/>
+            <a:endParaRPr lang="pt-BR" dirty="0"/>
           </a:p>
         </p:txBody>
       </p:sp>
@@ -2961,7 +2962,7 @@
             </a:lvl1pPr>
           </a:lstStyle>
           <a:p>
-            <a:endParaRPr lang="pt-BR"/>
+            <a:endParaRPr lang="pt-BR" dirty="0"/>
           </a:p>
         </p:txBody>
       </p:sp>
@@ -3008,7 +3009,7 @@
               <a:rPr lang="pt-BR" smtClean="0"/>
               <a:t>‹nº›</a:t>
             </a:fld>
-            <a:endParaRPr lang="pt-BR"/>
+            <a:endParaRPr lang="pt-BR" dirty="0"/>
           </a:p>
         </p:txBody>
       </p:sp>
@@ -4070,6 +4071,106 @@
 </p:sld>
 </file>
 
+<file path=ppt/slides/slide9.xml><?xml version="1.0" encoding="utf-8"?>
+<p:sld xmlns:a="http://schemas.openxmlformats.org/drawingml/2006/main" xmlns:r="http://schemas.openxmlformats.org/officeDocument/2006/relationships" xmlns:p="http://schemas.openxmlformats.org/presentationml/2006/main">
+  <p:cSld>
+    <p:spTree>
+      <p:nvGrpSpPr>
+        <p:cNvPr id="1" name=""/>
+        <p:cNvGrpSpPr/>
+        <p:nvPr/>
+      </p:nvGrpSpPr>
+      <p:grpSpPr>
+        <a:xfrm>
+          <a:off x="0" y="0"/>
+          <a:ext cx="0" cy="0"/>
+          <a:chOff x="0" y="0"/>
+          <a:chExt cx="0" cy="0"/>
+        </a:xfrm>
+      </p:grpSpPr>
+      <p:sp>
+        <p:nvSpPr>
+          <p:cNvPr id="2" name="Título 1">
+            <a:extLst>
+              <a:ext uri="{FF2B5EF4-FFF2-40B4-BE49-F238E27FC236}">
+                <a16:creationId xmlns:a16="http://schemas.microsoft.com/office/drawing/2014/main" id="{D45F503D-C398-2693-6532-40DB31B8C5B0}"/>
+              </a:ext>
+            </a:extLst>
+          </p:cNvPr>
+          <p:cNvSpPr>
+            <a:spLocks noGrp="1"/>
+          </p:cNvSpPr>
+          <p:nvPr>
+            <p:ph type="title"/>
+          </p:nvPr>
+        </p:nvSpPr>
+        <p:spPr>
+          <a:xfrm>
+            <a:off x="1576431" y="2030137"/>
+            <a:ext cx="10515600" cy="3200706"/>
+          </a:xfrm>
+        </p:spPr>
+        <p:txBody>
+          <a:bodyPr>
+            <a:normAutofit/>
+          </a:bodyPr>
+          <a:lstStyle/>
+          <a:p>
+            <a:r>
+              <a:rPr lang="pt-BR" sz="3200" dirty="0"/>
+              <a:t> A princípio não é possível, porque para cada elemento inserido, ou removido da árvore, ele vai ter que verificar a altura e o balanceamento de cada sub-árvore. Então deve-se trabalhar com um ramo de cada vez, assim evitando mais que uma dupla rotação.</a:t>
+            </a:r>
+          </a:p>
+        </p:txBody>
+      </p:sp>
+      <p:pic>
+        <p:nvPicPr>
+          <p:cNvPr id="5" name="Espaço Reservado para Conteúdo 4">
+            <a:extLst>
+              <a:ext uri="{FF2B5EF4-FFF2-40B4-BE49-F238E27FC236}">
+                <a16:creationId xmlns:a16="http://schemas.microsoft.com/office/drawing/2014/main" id="{6F6CA5BD-17ED-7C8F-A209-3DE7A9B71AB3}"/>
+              </a:ext>
+            </a:extLst>
+          </p:cNvPr>
+          <p:cNvPicPr>
+            <a:picLocks noGrp="1" noChangeAspect="1"/>
+          </p:cNvPicPr>
+          <p:nvPr>
+            <p:ph idx="1"/>
+          </p:nvPr>
+        </p:nvPicPr>
+        <p:blipFill>
+          <a:blip r:embed="rId2">
+            <a:extLst>
+              <a:ext uri="{28A0092B-C50C-407E-A947-70E740481C1C}">
+                <a14:useLocalDpi xmlns:a14="http://schemas.microsoft.com/office/drawing/2010/main" val="0"/>
+              </a:ext>
+            </a:extLst>
+          </a:blip>
+          <a:stretch>
+            <a:fillRect/>
+          </a:stretch>
+        </p:blipFill>
+        <p:spPr>
+          <a:xfrm>
+            <a:off x="1432861" y="485956"/>
+            <a:ext cx="9326277" cy="638264"/>
+          </a:xfrm>
+        </p:spPr>
+      </p:pic>
+    </p:spTree>
+    <p:extLst>
+      <p:ext uri="{BB962C8B-B14F-4D97-AF65-F5344CB8AC3E}">
+        <p14:creationId xmlns:p14="http://schemas.microsoft.com/office/powerpoint/2010/main" val="3886290046"/>
+      </p:ext>
+    </p:extLst>
+  </p:cSld>
+  <p:clrMapOvr>
+    <a:masterClrMapping/>
+  </p:clrMapOvr>
+</p:sld>
+</file>
+
 <file path=ppt/theme/theme1.xml><?xml version="1.0" encoding="utf-8"?>
 <a:theme xmlns:a="http://schemas.openxmlformats.org/drawingml/2006/main" name="Tema do Office">
   <a:themeElements>

</xml_diff>